<commit_message>
final changes prior to QC
</commit_message>
<xml_diff>
--- a/Whiteboard design session/WDS trainer presentation - Azure Synapse Analytics and AI.pptx
+++ b/Whiteboard design session/WDS trainer presentation - Azure Synapse Analytics and AI.pptx
@@ -2583,7 +2583,7 @@
                 <a:ea typeface="+mn-ea"/>
                 <a:cs typeface="+mn-cs"/>
               </a:rPr>
-              <a:t>Azure Synapse Analytics supports open source Apache Spark and the execution of Python, Scala and (in the near future) R code. Their data team would be able to use the familiar Jupyter notebooks and leverage their favorite libraries.</a:t>
+              <a:t>Azure Synapse Analytics supports open source Apache Spark and the execution of Python, Scala and (in the near future) R code. Their data team would be able to use the familiar Jupyter notebooks and leverage their favorite libraries to prepare data within Azure Synapse Analytics. It is recommended that they use Azure Machine Learning Studio for model training and auto ml scenarios.</a:t>
             </a:r>
           </a:p>
           <a:p>
@@ -7314,7 +7314,7 @@
                 <a:effectLst/>
                 <a:latin typeface="Consolas" panose="020B0609020204030204" pitchFamily="49" charset="0"/>
               </a:rPr>
-              <a:t>By using Azure Machine Learning in the solution, WWI will be able to take the models trained elsewhere in the solution and deploy them as REST webservices that are hosted in the Azure Kubernetes Services or Azure Container Instances. They can deploy the webservices from AKS using the Azure Machine Learning SDK. Model deployment typically involves creating a scoring web service script that contains the logic of the web service. This script loads the model from disk and then uses the model for scoring and returns the scored result. By integrating with the Azure Machine Learning model registry, the scoring script can automatically pull the latest model directly from the Azure Machine Learning model registry when the webservice first starts up, ensuring that the web service is always using the latest model, if this is desired. Web services deployed in this fashion can be configured to expose a Swagger </a:t>
+              <a:t>By using Azure Machine Learning in the solution, WWI will be able to take the models trained elsewhere in the solution and deploy them as REST webservices that are hosted in the Azure Kubernetes Services or Azure Container Instances. They can deploy the webservices from AKS using the Azure Machine Learning SDK or directly within the Azure Machine Learning Studio product. Depending on the model it may be possible to have a code-free model deployment using AML Studio – or  Model deployment may involve creating a scoring web service script that contains the logic of the web service. This script loads the model from disk and then uses the model for scoring and returns the scored result. By integrating with the Azure Machine Learning model registry, the scoring script can automatically pull the latest model directly from the Azure Machine Learning model registry when the webservice first starts up, ensuring that the web service is always using the latest model, if this is desired. Web services deployed in this fashion can be configured to expose a Swagger </a:t>
             </a:r>
             <a:r>
               <a:rPr lang="en-US" b="0" dirty="0" err="1">
@@ -7475,7 +7475,7 @@
                 <a:effectLst/>
                 <a:latin typeface="Consolas" panose="020B0609020204030204" pitchFamily="49" charset="0"/>
               </a:rPr>
-              <a:t>. This approach leverages Azure DevOps. The overall approach is to orchestrate continuous integration and continuous delivery Azure Pipelines from Azure DevOps. These pipelines are triggered by changes to artifacts that describe a machine learning pipeline, that is created with the Azure Machine Learning SDK. For example, checking in a change to the model training script executes the Azure Pipelines Build Pipeline, which trains (or re-trains) the model and creates the container image. Then this triggers an Azure Pipelines Release pipeline that deploys the model as a web service, by using the Docker image that was created in the Build pipeline. Once in production, the scoring web service is monitored using a combination of Application Insights and Azure Storage. This approach enables the deployment pipeline to be re-run to update any component of the solution, included models which have been re-trained.</a:t>
+              <a:t>. This approach leverages Azure DevOps. The overall approach is to orchestrate continuous integration and continuous delivery Azure Pipelines from Azure DevOps. These pipelines are triggered by changes to artifacts that describe a machine learning pipeline. These pipelines are created with the Azure Machine Learning SDK or directly within the AML Studio UI. For example, checking in a change to the model training script executes the Azure Pipelines Build Pipeline, which trains (or re-trains) the model and creates the container image. Then this triggers an Azure Pipelines Release pipeline that deploys the model as a web service, by using the Docker image that was created in the Build pipeline. Once in production, the scoring web service is monitored using a combination of Application Insights and Azure Storage. This approach enables the deployment pipeline to be re-run to update any component of the solution, included models which have been re-trained.</a:t>
             </a:r>
             <a:endParaRPr lang="en-US" sz="1200" b="0" i="0" u="none" strike="noStrike" kern="1200" dirty="0">
               <a:solidFill>
@@ -7716,7 +7716,7 @@
                   <a:prstClr val="black"/>
                 </a:solidFill>
               </a:rPr>
-              <a:t>10/7/2020 12:26 AM</a:t>
+              <a:t>10/7/2020 6:57 AM</a:t>
             </a:fld>
             <a:endParaRPr lang="en-US" dirty="0">
               <a:solidFill>
@@ -28446,6 +28446,15 @@
 </file>
 
 <file path=customXml/item1.xml><?xml version="1.0" encoding="utf-8"?>
+<p:properties xmlns:p="http://schemas.microsoft.com/office/2006/metadata/properties" xmlns:xsi="http://www.w3.org/2001/XMLSchema-instance" xmlns:pc="http://schemas.microsoft.com/office/infopath/2007/PartnerControls">
+  <documentManagement>
+    <_ip_UnifiedCompliancePolicyUIAction xmlns="http://schemas.microsoft.com/sharepoint/v3" xsi:nil="true"/>
+    <_ip_UnifiedCompliancePolicyProperties xmlns="http://schemas.microsoft.com/sharepoint/v3" xsi:nil="true"/>
+  </documentManagement>
+</p:properties>
+</file>
+
+<file path=customXml/item2.xml><?xml version="1.0" encoding="utf-8"?>
 <ct:contentTypeSchema xmlns:ct="http://schemas.microsoft.com/office/2006/metadata/contentType" xmlns:ma="http://schemas.microsoft.com/office/2006/metadata/properties/metaAttributes" ct:_="" ma:_="" ma:contentTypeName="Document" ma:contentTypeID="0x010100D15DFA3690A15B4081582BBCC6BEAC3E" ma:contentTypeVersion="9" ma:contentTypeDescription="Create a new document." ma:contentTypeScope="" ma:versionID="642da1784587cbe85a7fdbbe4dc36103">
   <xsd:schema xmlns:xsd="http://www.w3.org/2001/XMLSchema" xmlns:xs="http://www.w3.org/2001/XMLSchema" xmlns:p="http://schemas.microsoft.com/office/2006/metadata/properties" xmlns:ns1="http://schemas.microsoft.com/sharepoint/v3" xmlns:ns2="2023ac63-7b75-4916-a9ee-591457758eee" xmlns:ns3="d9c797ad-d7c3-4982-82b7-81352a75e4a5" targetNamespace="http://schemas.microsoft.com/office/2006/metadata/properties" ma:root="true" ma:fieldsID="91198b0246576053cc55dd2c67035a89" ns1:_="" ns2:_="" ns3:_="">
     <xsd:import namespace="http://schemas.microsoft.com/sharepoint/v3"/>
@@ -28647,15 +28656,6 @@
 </ct:contentTypeSchema>
 </file>
 
-<file path=customXml/item2.xml><?xml version="1.0" encoding="utf-8"?>
-<p:properties xmlns:p="http://schemas.microsoft.com/office/2006/metadata/properties" xmlns:xsi="http://www.w3.org/2001/XMLSchema-instance" xmlns:pc="http://schemas.microsoft.com/office/infopath/2007/PartnerControls">
-  <documentManagement>
-    <_ip_UnifiedCompliancePolicyUIAction xmlns="http://schemas.microsoft.com/sharepoint/v3" xsi:nil="true"/>
-    <_ip_UnifiedCompliancePolicyProperties xmlns="http://schemas.microsoft.com/sharepoint/v3" xsi:nil="true"/>
-  </documentManagement>
-</p:properties>
-</file>
-
 <file path=customXml/item3.xml><?xml version="1.0" encoding="utf-8"?>
 <?mso-contentType ?>
 <FormTemplates xmlns="http://schemas.microsoft.com/sharepoint/v3/contenttype/forms">
@@ -28666,6 +28666,24 @@
 </file>
 
 <file path=customXml/itemProps1.xml><?xml version="1.0" encoding="utf-8"?>
+<ds:datastoreItem xmlns:ds="http://schemas.openxmlformats.org/officeDocument/2006/customXml" ds:itemID="{BAF7D529-36AB-45DA-B239-2F912F2D1610}">
+  <ds:schemaRefs>
+    <ds:schemaRef ds:uri="http://schemas.microsoft.com/office/2006/documentManagement/types"/>
+    <ds:schemaRef ds:uri="http://schemas.microsoft.com/office/infopath/2007/PartnerControls"/>
+    <ds:schemaRef ds:uri="2023ac63-7b75-4916-a9ee-591457758eee"/>
+    <ds:schemaRef ds:uri="http://purl.org/dc/elements/1.1/"/>
+    <ds:schemaRef ds:uri="http://schemas.microsoft.com/office/2006/metadata/properties"/>
+    <ds:schemaRef ds:uri="http://schemas.microsoft.com/sharepoint/v3"/>
+    <ds:schemaRef ds:uri="http://purl.org/dc/terms/"/>
+    <ds:schemaRef ds:uri="http://schemas.openxmlformats.org/package/2006/metadata/core-properties"/>
+    <ds:schemaRef ds:uri="d9c797ad-d7c3-4982-82b7-81352a75e4a5"/>
+    <ds:schemaRef ds:uri="http://www.w3.org/XML/1998/namespace"/>
+    <ds:schemaRef ds:uri="http://purl.org/dc/dcmitype/"/>
+  </ds:schemaRefs>
+</ds:datastoreItem>
+</file>
+
+<file path=customXml/itemProps2.xml><?xml version="1.0" encoding="utf-8"?>
 <ds:datastoreItem xmlns:ds="http://schemas.openxmlformats.org/officeDocument/2006/customXml" ds:itemID="{255F5BEB-6AD6-480A-8556-C80C5EBC10F2}">
   <ds:schemaRefs>
     <ds:schemaRef ds:uri="http://schemas.microsoft.com/office/2006/metadata/contentType"/>
@@ -28685,24 +28703,6 @@
 </ds:datastoreItem>
 </file>
 
-<file path=customXml/itemProps2.xml><?xml version="1.0" encoding="utf-8"?>
-<ds:datastoreItem xmlns:ds="http://schemas.openxmlformats.org/officeDocument/2006/customXml" ds:itemID="{BAF7D529-36AB-45DA-B239-2F912F2D1610}">
-  <ds:schemaRefs>
-    <ds:schemaRef ds:uri="http://schemas.microsoft.com/office/2006/documentManagement/types"/>
-    <ds:schemaRef ds:uri="http://schemas.microsoft.com/office/infopath/2007/PartnerControls"/>
-    <ds:schemaRef ds:uri="2023ac63-7b75-4916-a9ee-591457758eee"/>
-    <ds:schemaRef ds:uri="http://purl.org/dc/elements/1.1/"/>
-    <ds:schemaRef ds:uri="http://schemas.microsoft.com/office/2006/metadata/properties"/>
-    <ds:schemaRef ds:uri="http://schemas.microsoft.com/sharepoint/v3"/>
-    <ds:schemaRef ds:uri="http://purl.org/dc/terms/"/>
-    <ds:schemaRef ds:uri="http://schemas.openxmlformats.org/package/2006/metadata/core-properties"/>
-    <ds:schemaRef ds:uri="d9c797ad-d7c3-4982-82b7-81352a75e4a5"/>
-    <ds:schemaRef ds:uri="http://www.w3.org/XML/1998/namespace"/>
-    <ds:schemaRef ds:uri="http://purl.org/dc/dcmitype/"/>
-  </ds:schemaRefs>
-</ds:datastoreItem>
-</file>
-
 <file path=customXml/itemProps3.xml><?xml version="1.0" encoding="utf-8"?>
 <ds:datastoreItem xmlns:ds="http://schemas.openxmlformats.org/officeDocument/2006/customXml" ds:itemID="{F18501AF-04CF-4482-BAE1-607B49DDC378}">
   <ds:schemaRefs>

</xml_diff>

<commit_message>
for real this time.
</commit_message>
<xml_diff>
--- a/Whiteboard design session/WDS trainer presentation - Azure Synapse Analytics and AI.pptx
+++ b/Whiteboard design session/WDS trainer presentation - Azure Synapse Analytics and AI.pptx
@@ -7716,7 +7716,7 @@
                   <a:prstClr val="black"/>
                 </a:solidFill>
               </a:rPr>
-              <a:t>10/7/2020 6:57 AM</a:t>
+              <a:t>10/7/2020 7:07 AM</a:t>
             </a:fld>
             <a:endParaRPr lang="en-US" dirty="0">
               <a:solidFill>
@@ -23195,7 +23195,7 @@
       </p:sp>
       <p:pic>
         <p:nvPicPr>
-          <p:cNvPr id="4" name="Picture 3">
+          <p:cNvPr id="4" name="Picture 3" descr="The notes on the slide describe the image.">
             <a:extLst>
               <a:ext uri="{FF2B5EF4-FFF2-40B4-BE49-F238E27FC236}">
                 <a16:creationId xmlns:a16="http://schemas.microsoft.com/office/drawing/2014/main" id="{F9CA0F88-74A7-4A52-B58F-DAF42656F072}"/>
@@ -28446,15 +28446,6 @@
 </file>
 
 <file path=customXml/item1.xml><?xml version="1.0" encoding="utf-8"?>
-<p:properties xmlns:p="http://schemas.microsoft.com/office/2006/metadata/properties" xmlns:xsi="http://www.w3.org/2001/XMLSchema-instance" xmlns:pc="http://schemas.microsoft.com/office/infopath/2007/PartnerControls">
-  <documentManagement>
-    <_ip_UnifiedCompliancePolicyUIAction xmlns="http://schemas.microsoft.com/sharepoint/v3" xsi:nil="true"/>
-    <_ip_UnifiedCompliancePolicyProperties xmlns="http://schemas.microsoft.com/sharepoint/v3" xsi:nil="true"/>
-  </documentManagement>
-</p:properties>
-</file>
-
-<file path=customXml/item2.xml><?xml version="1.0" encoding="utf-8"?>
 <ct:contentTypeSchema xmlns:ct="http://schemas.microsoft.com/office/2006/metadata/contentType" xmlns:ma="http://schemas.microsoft.com/office/2006/metadata/properties/metaAttributes" ct:_="" ma:_="" ma:contentTypeName="Document" ma:contentTypeID="0x010100D15DFA3690A15B4081582BBCC6BEAC3E" ma:contentTypeVersion="9" ma:contentTypeDescription="Create a new document." ma:contentTypeScope="" ma:versionID="642da1784587cbe85a7fdbbe4dc36103">
   <xsd:schema xmlns:xsd="http://www.w3.org/2001/XMLSchema" xmlns:xs="http://www.w3.org/2001/XMLSchema" xmlns:p="http://schemas.microsoft.com/office/2006/metadata/properties" xmlns:ns1="http://schemas.microsoft.com/sharepoint/v3" xmlns:ns2="2023ac63-7b75-4916-a9ee-591457758eee" xmlns:ns3="d9c797ad-d7c3-4982-82b7-81352a75e4a5" targetNamespace="http://schemas.microsoft.com/office/2006/metadata/properties" ma:root="true" ma:fieldsID="91198b0246576053cc55dd2c67035a89" ns1:_="" ns2:_="" ns3:_="">
     <xsd:import namespace="http://schemas.microsoft.com/sharepoint/v3"/>
@@ -28656,6 +28647,15 @@
 </ct:contentTypeSchema>
 </file>
 
+<file path=customXml/item2.xml><?xml version="1.0" encoding="utf-8"?>
+<p:properties xmlns:p="http://schemas.microsoft.com/office/2006/metadata/properties" xmlns:xsi="http://www.w3.org/2001/XMLSchema-instance" xmlns:pc="http://schemas.microsoft.com/office/infopath/2007/PartnerControls">
+  <documentManagement>
+    <_ip_UnifiedCompliancePolicyUIAction xmlns="http://schemas.microsoft.com/sharepoint/v3" xsi:nil="true"/>
+    <_ip_UnifiedCompliancePolicyProperties xmlns="http://schemas.microsoft.com/sharepoint/v3" xsi:nil="true"/>
+  </documentManagement>
+</p:properties>
+</file>
+
 <file path=customXml/item3.xml><?xml version="1.0" encoding="utf-8"?>
 <?mso-contentType ?>
 <FormTemplates xmlns="http://schemas.microsoft.com/sharepoint/v3/contenttype/forms">
@@ -28666,24 +28666,6 @@
 </file>
 
 <file path=customXml/itemProps1.xml><?xml version="1.0" encoding="utf-8"?>
-<ds:datastoreItem xmlns:ds="http://schemas.openxmlformats.org/officeDocument/2006/customXml" ds:itemID="{BAF7D529-36AB-45DA-B239-2F912F2D1610}">
-  <ds:schemaRefs>
-    <ds:schemaRef ds:uri="http://schemas.microsoft.com/office/2006/documentManagement/types"/>
-    <ds:schemaRef ds:uri="http://schemas.microsoft.com/office/infopath/2007/PartnerControls"/>
-    <ds:schemaRef ds:uri="2023ac63-7b75-4916-a9ee-591457758eee"/>
-    <ds:schemaRef ds:uri="http://purl.org/dc/elements/1.1/"/>
-    <ds:schemaRef ds:uri="http://schemas.microsoft.com/office/2006/metadata/properties"/>
-    <ds:schemaRef ds:uri="http://schemas.microsoft.com/sharepoint/v3"/>
-    <ds:schemaRef ds:uri="http://purl.org/dc/terms/"/>
-    <ds:schemaRef ds:uri="http://schemas.openxmlformats.org/package/2006/metadata/core-properties"/>
-    <ds:schemaRef ds:uri="d9c797ad-d7c3-4982-82b7-81352a75e4a5"/>
-    <ds:schemaRef ds:uri="http://www.w3.org/XML/1998/namespace"/>
-    <ds:schemaRef ds:uri="http://purl.org/dc/dcmitype/"/>
-  </ds:schemaRefs>
-</ds:datastoreItem>
-</file>
-
-<file path=customXml/itemProps2.xml><?xml version="1.0" encoding="utf-8"?>
 <ds:datastoreItem xmlns:ds="http://schemas.openxmlformats.org/officeDocument/2006/customXml" ds:itemID="{255F5BEB-6AD6-480A-8556-C80C5EBC10F2}">
   <ds:schemaRefs>
     <ds:schemaRef ds:uri="http://schemas.microsoft.com/office/2006/metadata/contentType"/>
@@ -28703,6 +28685,24 @@
 </ds:datastoreItem>
 </file>
 
+<file path=customXml/itemProps2.xml><?xml version="1.0" encoding="utf-8"?>
+<ds:datastoreItem xmlns:ds="http://schemas.openxmlformats.org/officeDocument/2006/customXml" ds:itemID="{BAF7D529-36AB-45DA-B239-2F912F2D1610}">
+  <ds:schemaRefs>
+    <ds:schemaRef ds:uri="http://schemas.microsoft.com/office/2006/documentManagement/types"/>
+    <ds:schemaRef ds:uri="http://schemas.microsoft.com/office/infopath/2007/PartnerControls"/>
+    <ds:schemaRef ds:uri="2023ac63-7b75-4916-a9ee-591457758eee"/>
+    <ds:schemaRef ds:uri="http://purl.org/dc/elements/1.1/"/>
+    <ds:schemaRef ds:uri="http://schemas.microsoft.com/office/2006/metadata/properties"/>
+    <ds:schemaRef ds:uri="http://schemas.microsoft.com/sharepoint/v3"/>
+    <ds:schemaRef ds:uri="http://purl.org/dc/terms/"/>
+    <ds:schemaRef ds:uri="http://schemas.openxmlformats.org/package/2006/metadata/core-properties"/>
+    <ds:schemaRef ds:uri="d9c797ad-d7c3-4982-82b7-81352a75e4a5"/>
+    <ds:schemaRef ds:uri="http://www.w3.org/XML/1998/namespace"/>
+    <ds:schemaRef ds:uri="http://purl.org/dc/dcmitype/"/>
+  </ds:schemaRefs>
+</ds:datastoreItem>
+</file>
+
 <file path=customXml/itemProps3.xml><?xml version="1.0" encoding="utf-8"?>
 <ds:datastoreItem xmlns:ds="http://schemas.openxmlformats.org/officeDocument/2006/customXml" ds:itemID="{F18501AF-04CF-4482-BAE1-607B49DDC378}">
   <ds:schemaRefs>

</xml_diff>